<commit_message>
Completed and edited SRS doc and ppt uploaded
</commit_message>
<xml_diff>
--- a/Megan/MedVoiceSRS.pptx
+++ b/Megan/MedVoiceSRS.pptx
@@ -4842,34 +4842,34 @@
           <a:lstStyle/>
           <a:p>
             <a:r>
-              <a:rPr lang="en-US" dirty="0"/>
+              <a:rPr lang="en-US" b="1" dirty="0"/>
               <a:t>Alva Dynamics LLC</a:t>
             </a:r>
           </a:p>
           <a:p>
             <a:r>
-              <a:rPr lang="en-US" dirty="0" err="1"/>
+              <a:rPr lang="en-US" b="1" dirty="0" err="1"/>
               <a:t>MedVoice</a:t>
             </a:r>
             <a:r>
-              <a:rPr lang="en-US" dirty="0"/>
+              <a:rPr lang="en-US" b="1" dirty="0"/>
               <a:t> Bio Tech</a:t>
             </a:r>
           </a:p>
           <a:p>
             <a:r>
-              <a:rPr lang="en-US" dirty="0"/>
+              <a:rPr lang="en-US" b="1" dirty="0"/>
               <a:t>Megan Lyn A. Del Rosario</a:t>
             </a:r>
           </a:p>
           <a:p>
             <a:r>
-              <a:rPr lang="en-US" dirty="0"/>
+              <a:rPr lang="en-US" b="1" dirty="0"/>
               <a:t>November, 2015</a:t>
             </a:r>
           </a:p>
           <a:p>
-            <a:endParaRPr lang="en-US" dirty="0"/>
+            <a:endParaRPr lang="en-US" b="1" dirty="0"/>
           </a:p>
         </p:txBody>
       </p:sp>
@@ -5050,12 +5050,8 @@
           <a:lstStyle/>
           <a:p>
             <a:r>
-              <a:rPr lang="en-US" dirty="0" smtClean="0"/>
-              <a:t>The </a:t>
-            </a:r>
-            <a:r>
               <a:rPr lang="en-US" dirty="0"/>
-              <a:t>purpose of this document is to give a detailed description of the requirements for the data analytics portion of </a:t>
+              <a:t>The purpose of this document is to give a detailed description of the requirements for the data analytics portion of </a:t>
             </a:r>
             <a:r>
               <a:rPr lang="en-US" dirty="0" err="1"/>
@@ -5063,11 +5059,24 @@
             </a:r>
             <a:r>
               <a:rPr lang="en-US" dirty="0"/>
-              <a:t>. It will illustrate the purpose and complete declaration for the development of the system. It will also explain system constraints, interface and applicable interactions with other external applications. This document is primarily intended to be proposed to the customer for its approval and a reference for developing the first version of the mobile application for the development team. The use of the mobile application itself is intended for the general public and male population.</a:t>
-            </a:r>
-          </a:p>
-          <a:p>
-            <a:endParaRPr lang="en-US" dirty="0"/>
+              <a:t>. It will illustrate the purpose and complete declaration for the development of the system. It will also explain system constraints, interface and applicable interactions with other external applications. This document is primarily intended to be proposed to the customer for its approval and a reference for developing </a:t>
+            </a:r>
+            <a:r>
+              <a:rPr lang="en-US" dirty="0" err="1"/>
+              <a:t>MedVoice</a:t>
+            </a:r>
+            <a:r>
+              <a:rPr lang="en-US" dirty="0"/>
+              <a:t> for the development team. The use of </a:t>
+            </a:r>
+            <a:r>
+              <a:rPr lang="en-US" dirty="0" err="1"/>
+              <a:t>MedVoice</a:t>
+            </a:r>
+            <a:r>
+              <a:rPr lang="en-US" dirty="0"/>
+              <a:t> is intended for the general public and male population.</a:t>
+            </a:r>
           </a:p>
         </p:txBody>
       </p:sp>
@@ -5175,27 +5184,54 @@
         </p:nvSpPr>
         <p:spPr/>
         <p:txBody>
-          <a:bodyPr/>
-          <a:lstStyle/>
-          <a:p>
-            <a:r>
-              <a:rPr lang="en-US" dirty="0"/>
-              <a:t>The mobile application promotes health awareness. Using voice recognition, and specific user inputs (i.e. gender, height, weight) the mobile application will display possible conditions predisposed to the user based on the analysis of the collected and input data. The mobile application also allows the user to view their health history, and form a social network with care providers and other care recipients with similar predisposed conditions and interests</a:t>
-            </a:r>
-            <a:r>
-              <a:rPr lang="en-US" dirty="0" smtClean="0"/>
+          <a:bodyPr>
+            <a:normAutofit/>
+          </a:bodyPr>
+          <a:lstStyle/>
+          <a:p>
+            <a:pPr lvl="1"/>
+            <a:r>
+              <a:rPr lang="en-US" sz="2400" dirty="0" err="1"/>
+              <a:t>MedVoice</a:t>
+            </a:r>
+            <a:r>
+              <a:rPr lang="en-US" sz="2400" dirty="0"/>
+              <a:t> promotes health awareness. Using voice recognition, and specific user inputs (i.e. gender, height, weight) the mobile application will display possible conditions predisposed to the user based on the analysis of the collected and input data. </a:t>
+            </a:r>
+            <a:r>
+              <a:rPr lang="en-US" sz="2400" dirty="0" err="1" smtClean="0"/>
+              <a:t>MedVoice</a:t>
+            </a:r>
+            <a:r>
+              <a:rPr lang="en-US" sz="2400" dirty="0" smtClean="0"/>
+              <a:t> </a:t>
+            </a:r>
+            <a:r>
+              <a:rPr lang="en-US" sz="2400" dirty="0"/>
+              <a:t>also allows the user to view their health history, and form a social network with care providers and other care recipients with similar predisposed conditions and interests</a:t>
+            </a:r>
+            <a:r>
+              <a:rPr lang="en-US" sz="2400" dirty="0" smtClean="0"/>
               <a:t>.</a:t>
             </a:r>
-            <a:endParaRPr lang="en-US" dirty="0"/>
-          </a:p>
-          <a:p>
-            <a:r>
-              <a:rPr lang="en-US" b="1" dirty="0"/>
-              <a:t>The mobile application will have the ability to retrieve and send data to and from databases upon logging into the application. Using the collected data, users will be grouped according interests and similarities.</a:t>
-            </a:r>
-          </a:p>
-          <a:p>
-            <a:endParaRPr lang="en-US" dirty="0"/>
+          </a:p>
+          <a:p>
+            <a:pPr marL="201168" lvl="1" indent="0">
+              <a:buNone/>
+            </a:pPr>
+            <a:endParaRPr lang="en-US" sz="2400" dirty="0"/>
+          </a:p>
+          <a:p>
+            <a:pPr lvl="1"/>
+            <a:r>
+              <a:rPr lang="en-US" sz="2400" b="1" dirty="0" err="1" smtClean="0"/>
+              <a:t>MedVoice</a:t>
+            </a:r>
+            <a:r>
+              <a:rPr lang="en-US" sz="2400" b="1" dirty="0" smtClean="0"/>
+              <a:t> will have the ability to retrieve and send data to and from databases upon logging into the application. Using the collected data, users will be grouped according to interests and similarities.</a:t>
+            </a:r>
+            <a:endParaRPr lang="en-US" sz="2400" b="1" dirty="0"/>
           </a:p>
         </p:txBody>
       </p:sp>
@@ -5517,7 +5553,7 @@
         </p:blipFill>
         <p:spPr>
           <a:xfrm>
-            <a:off x="4439265" y="1961535"/>
+            <a:off x="4439265" y="1946787"/>
             <a:ext cx="3438844" cy="3907453"/>
           </a:xfrm>
         </p:spPr>

</xml_diff>

<commit_message>
Uploaded complete SRS doc, PDF and PPT
</commit_message>
<xml_diff>
--- a/Megan/MedVoiceSRS.pptx
+++ b/Megan/MedVoiceSRS.pptx
@@ -4935,7 +4935,7 @@
       </p:sp>
       <p:pic>
         <p:nvPicPr>
-          <p:cNvPr id="4" name="Content Placeholder 3"/>
+          <p:cNvPr id="6" name="Content Placeholder 5"/>
           <p:cNvPicPr>
             <a:picLocks noGrp="1" noChangeAspect="1"/>
           </p:cNvPicPr>
@@ -4957,8 +4957,8 @@
         </p:blipFill>
         <p:spPr>
           <a:xfrm>
-            <a:off x="4668099" y="1846263"/>
-            <a:ext cx="2916127" cy="4022725"/>
+            <a:off x="4573769" y="1846263"/>
+            <a:ext cx="3104787" cy="4022725"/>
           </a:xfrm>
         </p:spPr>
       </p:pic>

</xml_diff>